<commit_message>
Mocked API POST on memory
</commit_message>
<xml_diff>
--- a/AXPE_FRONT_TallerUSAL_.pptx
+++ b/AXPE_FRONT_TallerUSAL_.pptx
@@ -219,7 +219,7 @@
           <a:p>
             <a:fld id="{B6DE7779-352D-4266-B34C-E3568CFA9023}" type="datetimeFigureOut">
               <a:rPr lang="es-ES" smtClean="0"/>
-              <a:t>7/3/24</a:t>
+              <a:t>11/3/24</a:t>
             </a:fld>
             <a:endParaRPr lang="es-ES"/>
           </a:p>
@@ -1658,7 +1658,7 @@
           <a:p>
             <a:fld id="{80A585E9-3F29-6D4E-ACD6-665777B2053A}" type="datetimeFigureOut">
               <a:rPr lang="es-ES" smtClean="0"/>
-              <a:t>7/3/24</a:t>
+              <a:t>11/3/24</a:t>
             </a:fld>
             <a:endParaRPr lang="es-ES"/>
           </a:p>
@@ -1856,7 +1856,7 @@
           <a:p>
             <a:fld id="{80A585E9-3F29-6D4E-ACD6-665777B2053A}" type="datetimeFigureOut">
               <a:rPr lang="es-ES" smtClean="0"/>
-              <a:t>7/3/24</a:t>
+              <a:t>11/3/24</a:t>
             </a:fld>
             <a:endParaRPr lang="es-ES"/>
           </a:p>
@@ -2064,7 +2064,7 @@
           <a:p>
             <a:fld id="{80A585E9-3F29-6D4E-ACD6-665777B2053A}" type="datetimeFigureOut">
               <a:rPr lang="es-ES" smtClean="0"/>
-              <a:t>7/3/24</a:t>
+              <a:t>11/3/24</a:t>
             </a:fld>
             <a:endParaRPr lang="es-ES"/>
           </a:p>
@@ -2262,7 +2262,7 @@
           <a:p>
             <a:fld id="{80A585E9-3F29-6D4E-ACD6-665777B2053A}" type="datetimeFigureOut">
               <a:rPr lang="es-ES" smtClean="0"/>
-              <a:t>7/3/24</a:t>
+              <a:t>11/3/24</a:t>
             </a:fld>
             <a:endParaRPr lang="es-ES"/>
           </a:p>
@@ -2537,7 +2537,7 @@
           <a:p>
             <a:fld id="{80A585E9-3F29-6D4E-ACD6-665777B2053A}" type="datetimeFigureOut">
               <a:rPr lang="es-ES" smtClean="0"/>
-              <a:t>7/3/24</a:t>
+              <a:t>11/3/24</a:t>
             </a:fld>
             <a:endParaRPr lang="es-ES"/>
           </a:p>
@@ -2802,7 +2802,7 @@
           <a:p>
             <a:fld id="{80A585E9-3F29-6D4E-ACD6-665777B2053A}" type="datetimeFigureOut">
               <a:rPr lang="es-ES" smtClean="0"/>
-              <a:t>7/3/24</a:t>
+              <a:t>11/3/24</a:t>
             </a:fld>
             <a:endParaRPr lang="es-ES"/>
           </a:p>
@@ -3214,7 +3214,7 @@
           <a:p>
             <a:fld id="{80A585E9-3F29-6D4E-ACD6-665777B2053A}" type="datetimeFigureOut">
               <a:rPr lang="es-ES" smtClean="0"/>
-              <a:t>7/3/24</a:t>
+              <a:t>11/3/24</a:t>
             </a:fld>
             <a:endParaRPr lang="es-ES"/>
           </a:p>
@@ -3355,7 +3355,7 @@
           <a:p>
             <a:fld id="{80A585E9-3F29-6D4E-ACD6-665777B2053A}" type="datetimeFigureOut">
               <a:rPr lang="es-ES" smtClean="0"/>
-              <a:t>7/3/24</a:t>
+              <a:t>11/3/24</a:t>
             </a:fld>
             <a:endParaRPr lang="es-ES"/>
           </a:p>
@@ -3468,7 +3468,7 @@
           <a:p>
             <a:fld id="{80A585E9-3F29-6D4E-ACD6-665777B2053A}" type="datetimeFigureOut">
               <a:rPr lang="es-ES" smtClean="0"/>
-              <a:t>7/3/24</a:t>
+              <a:t>11/3/24</a:t>
             </a:fld>
             <a:endParaRPr lang="es-ES"/>
           </a:p>
@@ -3779,7 +3779,7 @@
           <a:p>
             <a:fld id="{80A585E9-3F29-6D4E-ACD6-665777B2053A}" type="datetimeFigureOut">
               <a:rPr lang="es-ES" smtClean="0"/>
-              <a:t>7/3/24</a:t>
+              <a:t>11/3/24</a:t>
             </a:fld>
             <a:endParaRPr lang="es-ES"/>
           </a:p>
@@ -4067,7 +4067,7 @@
           <a:p>
             <a:fld id="{80A585E9-3F29-6D4E-ACD6-665777B2053A}" type="datetimeFigureOut">
               <a:rPr lang="es-ES" smtClean="0"/>
-              <a:t>7/3/24</a:t>
+              <a:t>11/3/24</a:t>
             </a:fld>
             <a:endParaRPr lang="es-ES"/>
           </a:p>
@@ -4308,7 +4308,7 @@
           <a:p>
             <a:fld id="{80A585E9-3F29-6D4E-ACD6-665777B2053A}" type="datetimeFigureOut">
               <a:rPr lang="es-ES" smtClean="0"/>
-              <a:t>7/3/24</a:t>
+              <a:t>11/3/24</a:t>
             </a:fld>
             <a:endParaRPr lang="es-ES"/>
           </a:p>
@@ -13261,12 +13261,6 @@
 </file>
 
 <file path=customXml/item1.xml><?xml version="1.0" encoding="utf-8"?>
-<p:properties xmlns:p="http://schemas.microsoft.com/office/2006/metadata/properties" xmlns:xsi="http://www.w3.org/2001/XMLSchema-instance" xmlns:pc="http://schemas.microsoft.com/office/infopath/2007/PartnerControls">
-  <documentManagement/>
-</p:properties>
-</file>
-
-<file path=customXml/item2.xml><?xml version="1.0" encoding="utf-8"?>
 <ct:contentTypeSchema xmlns:ct="http://schemas.microsoft.com/office/2006/metadata/contentType" xmlns:ma="http://schemas.microsoft.com/office/2006/metadata/properties/metaAttributes" ct:_="" ma:_="" ma:contentTypeName="Documento" ma:contentTypeID="0x010100E7F2B2EC4460034EA30A7475ACFAF5E1" ma:contentTypeVersion="4" ma:contentTypeDescription="Crear nuevo documento." ma:contentTypeScope="" ma:versionID="224a0642492d5ffa263e10e76a615c9d">
   <xsd:schema xmlns:xsd="http://www.w3.org/2001/XMLSchema" xmlns:xs="http://www.w3.org/2001/XMLSchema" xmlns:p="http://schemas.microsoft.com/office/2006/metadata/properties" xmlns:ns2="782acb9c-d06e-4256-9a80-165c233ae9f9" targetNamespace="http://schemas.microsoft.com/office/2006/metadata/properties" ma:root="true" ma:fieldsID="fa559abf687111e69f96e7951fefcf17" ns2:_="">
     <xsd:import namespace="782acb9c-d06e-4256-9a80-165c233ae9f9"/>
@@ -13410,6 +13404,12 @@
 </ct:contentTypeSchema>
 </file>
 
+<file path=customXml/item2.xml><?xml version="1.0" encoding="utf-8"?>
+<p:properties xmlns:p="http://schemas.microsoft.com/office/2006/metadata/properties" xmlns:xsi="http://www.w3.org/2001/XMLSchema-instance" xmlns:pc="http://schemas.microsoft.com/office/infopath/2007/PartnerControls">
+  <documentManagement/>
+</p:properties>
+</file>
+
 <file path=customXml/item3.xml><?xml version="1.0" encoding="utf-8"?>
 <?mso-contentType ?>
 <FormTemplates xmlns="http://schemas.microsoft.com/sharepoint/v3/contenttype/forms">
@@ -13420,22 +13420,6 @@
 </file>
 
 <file path=customXml/itemProps1.xml><?xml version="1.0" encoding="utf-8"?>
-<ds:datastoreItem xmlns:ds="http://schemas.openxmlformats.org/officeDocument/2006/customXml" ds:itemID="{6F653FC8-9771-44C4-AAF5-F45371A51B7E}">
-  <ds:schemaRefs>
-    <ds:schemaRef ds:uri="http://purl.org/dc/elements/1.1/"/>
-    <ds:schemaRef ds:uri="782acb9c-d06e-4256-9a80-165c233ae9f9"/>
-    <ds:schemaRef ds:uri="http://purl.org/dc/dcmitype/"/>
-    <ds:schemaRef ds:uri="http://schemas.microsoft.com/office/2006/documentManagement/types"/>
-    <ds:schemaRef ds:uri="http://purl.org/dc/terms/"/>
-    <ds:schemaRef ds:uri="http://www.w3.org/XML/1998/namespace"/>
-    <ds:schemaRef ds:uri="http://schemas.microsoft.com/office/infopath/2007/PartnerControls"/>
-    <ds:schemaRef ds:uri="http://schemas.openxmlformats.org/package/2006/metadata/core-properties"/>
-    <ds:schemaRef ds:uri="http://schemas.microsoft.com/office/2006/metadata/properties"/>
-  </ds:schemaRefs>
-</ds:datastoreItem>
-</file>
-
-<file path=customXml/itemProps2.xml><?xml version="1.0" encoding="utf-8"?>
 <ds:datastoreItem xmlns:ds="http://schemas.openxmlformats.org/officeDocument/2006/customXml" ds:itemID="{19DA4E1D-1B3C-4AD6-B6B2-8282C11F7A40}">
   <ds:schemaRefs>
     <ds:schemaRef ds:uri="782acb9c-d06e-4256-9a80-165c233ae9f9"/>
@@ -13453,6 +13437,22 @@
 </ds:datastoreItem>
 </file>
 
+<file path=customXml/itemProps2.xml><?xml version="1.0" encoding="utf-8"?>
+<ds:datastoreItem xmlns:ds="http://schemas.openxmlformats.org/officeDocument/2006/customXml" ds:itemID="{6F653FC8-9771-44C4-AAF5-F45371A51B7E}">
+  <ds:schemaRefs>
+    <ds:schemaRef ds:uri="http://purl.org/dc/elements/1.1/"/>
+    <ds:schemaRef ds:uri="782acb9c-d06e-4256-9a80-165c233ae9f9"/>
+    <ds:schemaRef ds:uri="http://purl.org/dc/dcmitype/"/>
+    <ds:schemaRef ds:uri="http://schemas.microsoft.com/office/2006/documentManagement/types"/>
+    <ds:schemaRef ds:uri="http://purl.org/dc/terms/"/>
+    <ds:schemaRef ds:uri="http://www.w3.org/XML/1998/namespace"/>
+    <ds:schemaRef ds:uri="http://schemas.microsoft.com/office/infopath/2007/PartnerControls"/>
+    <ds:schemaRef ds:uri="http://schemas.openxmlformats.org/package/2006/metadata/core-properties"/>
+    <ds:schemaRef ds:uri="http://schemas.microsoft.com/office/2006/metadata/properties"/>
+  </ds:schemaRefs>
+</ds:datastoreItem>
+</file>
+
 <file path=customXml/itemProps3.xml><?xml version="1.0" encoding="utf-8"?>
 <ds:datastoreItem xmlns:ds="http://schemas.openxmlformats.org/officeDocument/2006/customXml" ds:itemID="{41A4C341-6EBE-4782-B902-E8C7D71563F1}">
   <ds:schemaRefs>

</xml_diff>